<commit_message>
template format of Function and System Tree now in english
</commit_message>
<xml_diff>
--- a/docs/functional view/Function Tree Template.pptx
+++ b/docs/functional view/Function Tree Template.pptx
@@ -107,6 +107,11 @@
       </a:defRPr>
     </a:lvl9pPr>
   </p:defaultTextStyle>
+  <p:extLst>
+    <p:ext uri="{EFAFB233-063F-42B5-8137-9DF3F51BA10A}">
+      <p15:sldGuideLst xmlns:p15="http://schemas.microsoft.com/office/powerpoint/2012/main"/>
+    </p:ext>
+  </p:extLst>
 </p:presentation>
 </file>
 
@@ -879,18 +884,10 @@
         <a:lstStyle/>
         <a:p>
           <a:r>
-            <a:rPr lang="de-DE" sz="2000" dirty="0" err="1" smtClean="0"/>
-            <a:t>Function</a:t>
+            <a:rPr lang="en-GB" sz="2000" noProof="0" dirty="0" smtClean="0"/>
+            <a:t>Function Tree</a:t>
           </a:r>
-          <a:r>
-            <a:rPr lang="de-DE" sz="2000" dirty="0" smtClean="0"/>
-            <a:t> </a:t>
-          </a:r>
-          <a:r>
-            <a:rPr lang="de-DE" sz="2000" smtClean="0"/>
-            <a:t>Tree</a:t>
-          </a:r>
-          <a:endParaRPr lang="de-DE" sz="2000" dirty="0"/>
+          <a:endParaRPr lang="en-GB" sz="2000" noProof="0" dirty="0"/>
         </a:p>
       </dgm:t>
     </dgm:pt>
@@ -923,7 +920,7 @@
         <a:bodyPr/>
         <a:lstStyle/>
         <a:p>
-          <a:endParaRPr lang="de-DE" sz="2400" dirty="0"/>
+          <a:endParaRPr lang="en-GB" sz="2400" noProof="0" dirty="0"/>
         </a:p>
       </dgm:t>
     </dgm:pt>
@@ -956,7 +953,7 @@
         <a:bodyPr/>
         <a:lstStyle/>
         <a:p>
-          <a:endParaRPr lang="de-DE" sz="2400" dirty="0"/>
+          <a:endParaRPr lang="en-GB" sz="2400" noProof="0" dirty="0"/>
         </a:p>
       </dgm:t>
     </dgm:pt>
@@ -989,7 +986,7 @@
         <a:bodyPr/>
         <a:lstStyle/>
         <a:p>
-          <a:endParaRPr lang="de-DE" sz="2400" dirty="0"/>
+          <a:endParaRPr lang="en-GB" sz="2400" noProof="0" dirty="0"/>
         </a:p>
       </dgm:t>
     </dgm:pt>
@@ -1022,7 +1019,7 @@
         <a:bodyPr/>
         <a:lstStyle/>
         <a:p>
-          <a:endParaRPr lang="de-DE" sz="2400" dirty="0"/>
+          <a:endParaRPr lang="en-GB" sz="2400" noProof="0" dirty="0"/>
         </a:p>
       </dgm:t>
     </dgm:pt>
@@ -1055,7 +1052,7 @@
         <a:bodyPr/>
         <a:lstStyle/>
         <a:p>
-          <a:endParaRPr lang="de-DE" sz="2400" dirty="0"/>
+          <a:endParaRPr lang="en-GB" sz="2400" noProof="0" dirty="0"/>
         </a:p>
       </dgm:t>
     </dgm:pt>
@@ -1088,7 +1085,7 @@
         <a:bodyPr/>
         <a:lstStyle/>
         <a:p>
-          <a:endParaRPr lang="de-DE" sz="2400" dirty="0"/>
+          <a:endParaRPr lang="en-GB" sz="2400" noProof="0" dirty="0"/>
         </a:p>
       </dgm:t>
     </dgm:pt>
@@ -1121,7 +1118,7 @@
         <a:bodyPr/>
         <a:lstStyle/>
         <a:p>
-          <a:endParaRPr lang="de-DE" sz="2400" dirty="0"/>
+          <a:endParaRPr lang="en-GB" sz="2400" noProof="0" dirty="0"/>
         </a:p>
       </dgm:t>
     </dgm:pt>
@@ -1154,7 +1151,7 @@
         <a:bodyPr/>
         <a:lstStyle/>
         <a:p>
-          <a:endParaRPr lang="de-DE" sz="2400" dirty="0"/>
+          <a:endParaRPr lang="en-GB" sz="2400" noProof="0" dirty="0"/>
         </a:p>
       </dgm:t>
     </dgm:pt>
@@ -1187,7 +1184,7 @@
         <a:bodyPr/>
         <a:lstStyle/>
         <a:p>
-          <a:endParaRPr lang="de-DE" sz="2400" dirty="0"/>
+          <a:endParaRPr lang="en-GB" sz="2400" noProof="0" dirty="0"/>
         </a:p>
       </dgm:t>
     </dgm:pt>
@@ -1220,7 +1217,7 @@
         <a:bodyPr/>
         <a:lstStyle/>
         <a:p>
-          <a:endParaRPr lang="de-DE" sz="2400" dirty="0"/>
+          <a:endParaRPr lang="en-GB" sz="2400" noProof="0" dirty="0"/>
         </a:p>
       </dgm:t>
     </dgm:pt>
@@ -1286,7 +1283,7 @@
         <a:bodyPr/>
         <a:lstStyle/>
         <a:p>
-          <a:endParaRPr lang="de-DE" sz="2400" dirty="0"/>
+          <a:endParaRPr lang="en-GB" sz="2400" noProof="0" dirty="0"/>
         </a:p>
       </dgm:t>
     </dgm:pt>
@@ -2459,12 +2456,12 @@
     <dgm:cxn modelId="{59505271-238E-48E3-AE30-C7C7E680BC6B}" type="presOf" srcId="{2D79B3BB-3CB4-4799-852F-307C776B8AF2}" destId="{B9E99F7B-E049-49C3-8165-F794C57B1677}" srcOrd="0" destOrd="0" presId="urn:microsoft.com/office/officeart/2005/8/layout/orgChart1"/>
     <dgm:cxn modelId="{EF228E9C-9479-43BC-98A7-EB3435A993A9}" srcId="{049CAA4C-F1B5-42F1-8169-77E761031C0B}" destId="{38DB6A97-7CBA-46AA-9692-437B48BD87F6}" srcOrd="0" destOrd="0" parTransId="{D8A44F74-6BB7-40CD-9AC5-D895655B97EA}" sibTransId="{4FE1AB2B-7D2B-491E-9C4E-7A6F4BF4D4D4}"/>
     <dgm:cxn modelId="{5FA5D35B-9B3D-4560-BA07-7AB2BFEB51A8}" type="presOf" srcId="{0C2BE54D-B4E5-47E0-9484-D1EFAB4EB2C0}" destId="{555105EA-F2E1-4133-A9D7-A0253713B0E2}" srcOrd="0" destOrd="0" presId="urn:microsoft.com/office/officeart/2005/8/layout/orgChart1"/>
+    <dgm:cxn modelId="{BB8871B6-1A24-4237-9D99-3BA4C7F621B9}" type="presOf" srcId="{3CD34646-A4AA-46AC-839A-08732300643E}" destId="{D65EEC6C-7584-404D-A3EE-27917ABB4175}" srcOrd="1" destOrd="0" presId="urn:microsoft.com/office/officeart/2005/8/layout/orgChart1"/>
     <dgm:cxn modelId="{4BE8353F-2BC3-4A33-BD58-A6B4E2C6B219}" srcId="{6C4146EB-30C3-4E3B-BE7C-3202AC38603F}" destId="{49456BC8-6790-491F-B857-407CC5330FD5}" srcOrd="2" destOrd="0" parTransId="{3B86D01A-A2CE-4120-B9AD-45B8319CA354}" sibTransId="{D1B6148F-DA59-4DA0-BA05-204B68F8CF0C}"/>
-    <dgm:cxn modelId="{BB8871B6-1A24-4237-9D99-3BA4C7F621B9}" type="presOf" srcId="{3CD34646-A4AA-46AC-839A-08732300643E}" destId="{D65EEC6C-7584-404D-A3EE-27917ABB4175}" srcOrd="1" destOrd="0" presId="urn:microsoft.com/office/officeart/2005/8/layout/orgChart1"/>
     <dgm:cxn modelId="{193940F8-97BD-4B20-82B8-E67624FB84A3}" type="presOf" srcId="{2D79B3BB-3CB4-4799-852F-307C776B8AF2}" destId="{51B81A8E-4C6B-4A07-A7BD-37256E8D9C8A}" srcOrd="1" destOrd="0" presId="urn:microsoft.com/office/officeart/2005/8/layout/orgChart1"/>
     <dgm:cxn modelId="{CEEF6B63-10E9-46C2-B6AA-CB2A04714BF6}" type="presOf" srcId="{FCFB4EE6-E46F-4A9B-AD9E-7C163DD4FC2D}" destId="{6156ABD2-A004-43D0-94DC-6C27EB905983}" srcOrd="0" destOrd="0" presId="urn:microsoft.com/office/officeart/2005/8/layout/orgChart1"/>
+    <dgm:cxn modelId="{C14E5B01-CD3D-4C04-9518-D3CA08503F56}" type="presOf" srcId="{D776ED17-CF9F-4314-9242-DF844685E313}" destId="{1E4B017A-A1B4-45EA-BB6E-DFC1385D18C9}" srcOrd="1" destOrd="0" presId="urn:microsoft.com/office/officeart/2005/8/layout/orgChart1"/>
     <dgm:cxn modelId="{64C0B361-614B-4EC5-8108-32482D2D23E9}" srcId="{6C4146EB-30C3-4E3B-BE7C-3202AC38603F}" destId="{049CAA4C-F1B5-42F1-8169-77E761031C0B}" srcOrd="1" destOrd="0" parTransId="{D88C2E53-C341-41A0-816D-BAA62A2BF28D}" sibTransId="{D025815C-5BCB-43C2-BAA8-9DA7642720DE}"/>
-    <dgm:cxn modelId="{C14E5B01-CD3D-4C04-9518-D3CA08503F56}" type="presOf" srcId="{D776ED17-CF9F-4314-9242-DF844685E313}" destId="{1E4B017A-A1B4-45EA-BB6E-DFC1385D18C9}" srcOrd="1" destOrd="0" presId="urn:microsoft.com/office/officeart/2005/8/layout/orgChart1"/>
     <dgm:cxn modelId="{818B103A-177C-4492-BF46-C9A8BED21E82}" type="presOf" srcId="{E47FF557-B98F-4702-ADD6-1B3D79494FF7}" destId="{7FA4135D-F968-427F-BECF-9800E851FBF5}" srcOrd="1" destOrd="0" presId="urn:microsoft.com/office/officeart/2005/8/layout/orgChart1"/>
     <dgm:cxn modelId="{04E107CC-712A-40FA-83E5-8228029BD4F0}" type="presOf" srcId="{22FF23A0-4855-4194-956E-B89EB1D06382}" destId="{3540F26E-4693-4834-8FD1-F07E998225C9}" srcOrd="0" destOrd="0" presId="urn:microsoft.com/office/officeart/2005/8/layout/orgChart1"/>
     <dgm:cxn modelId="{1B4A4785-19F1-4E0B-A184-5F905A843EF9}" type="presOf" srcId="{B5D48C92-509F-40BB-A3FC-DAE1112F4A3D}" destId="{F5F391C7-36EC-4B8A-AD49-1E91604AC6BF}" srcOrd="0" destOrd="0" presId="urn:microsoft.com/office/officeart/2005/8/layout/orgChart1"/>
@@ -2476,8 +2473,8 @@
     <dgm:cxn modelId="{4A352135-F966-410B-96CD-710D870FDB30}" type="presOf" srcId="{0C225D41-2938-4975-BECB-6BE4B25F33C2}" destId="{E750B056-09FD-4F6D-9F22-4420A82BC332}" srcOrd="0" destOrd="0" presId="urn:microsoft.com/office/officeart/2005/8/layout/orgChart1"/>
     <dgm:cxn modelId="{A901432D-D729-418C-8DCD-935275E5D505}" type="presOf" srcId="{0C225D41-2938-4975-BECB-6BE4B25F33C2}" destId="{5B84F550-D5A6-4B4B-ADB9-A8A4240DC6EF}" srcOrd="1" destOrd="0" presId="urn:microsoft.com/office/officeart/2005/8/layout/orgChart1"/>
     <dgm:cxn modelId="{7B16BA26-12D2-4B81-A791-6149A8DF8F92}" type="presOf" srcId="{465B4F67-9494-4AD7-BD80-038E8FBAAE6C}" destId="{ABDEF8DC-E8C0-4CEF-ABE4-D367EB0CE6B4}" srcOrd="0" destOrd="0" presId="urn:microsoft.com/office/officeart/2005/8/layout/orgChart1"/>
+    <dgm:cxn modelId="{3499188A-7F4A-4896-8441-C556A8078BD2}" type="presOf" srcId="{539ACAE6-61A5-4094-B151-DAF0C9503AD3}" destId="{D76ED969-055B-4568-B19A-C7AC8F01C40E}" srcOrd="0" destOrd="0" presId="urn:microsoft.com/office/officeart/2005/8/layout/orgChart1"/>
     <dgm:cxn modelId="{D35DD225-F494-4BDA-9C73-4308B35960E6}" type="presOf" srcId="{6C4146EB-30C3-4E3B-BE7C-3202AC38603F}" destId="{C37A671E-08A2-4FD9-95F7-BEFA4CBB784C}" srcOrd="1" destOrd="0" presId="urn:microsoft.com/office/officeart/2005/8/layout/orgChart1"/>
-    <dgm:cxn modelId="{3499188A-7F4A-4896-8441-C556A8078BD2}" type="presOf" srcId="{539ACAE6-61A5-4094-B151-DAF0C9503AD3}" destId="{D76ED969-055B-4568-B19A-C7AC8F01C40E}" srcOrd="0" destOrd="0" presId="urn:microsoft.com/office/officeart/2005/8/layout/orgChart1"/>
     <dgm:cxn modelId="{B610D7AE-9355-4192-A733-D6C20353C434}" type="presOf" srcId="{049CAA4C-F1B5-42F1-8169-77E761031C0B}" destId="{743A0D42-ED27-4E8C-953F-1C1F4652FDFF}" srcOrd="0" destOrd="0" presId="urn:microsoft.com/office/officeart/2005/8/layout/orgChart1"/>
     <dgm:cxn modelId="{2E2DAA1F-AF3F-49B3-9993-F34CE0F6492F}" type="presOf" srcId="{E47FF557-B98F-4702-ADD6-1B3D79494FF7}" destId="{E8E8F372-82B7-42C0-9EBD-ABC3B9E1FC2E}" srcOrd="0" destOrd="0" presId="urn:microsoft.com/office/officeart/2005/8/layout/orgChart1"/>
     <dgm:cxn modelId="{64D91459-E570-4C82-A970-C5B2C76DBB52}" type="presParOf" srcId="{ABDEF8DC-E8C0-4CEF-ABE4-D367EB0CE6B4}" destId="{9D0E0FA1-BB71-48FE-A70D-0C132F27ED76}" srcOrd="0" destOrd="0" presId="urn:microsoft.com/office/officeart/2005/8/layout/orgChart1"/>
@@ -3395,18 +3392,10 @@
             </a:spcAft>
           </a:pPr>
           <a:r>
-            <a:rPr lang="de-DE" sz="2000" kern="1200" dirty="0" err="1" smtClean="0"/>
-            <a:t>Function</a:t>
+            <a:rPr lang="en-GB" sz="2000" kern="1200" noProof="0" dirty="0" smtClean="0"/>
+            <a:t>Function Tree</a:t>
           </a:r>
-          <a:r>
-            <a:rPr lang="de-DE" sz="2000" kern="1200" dirty="0" smtClean="0"/>
-            <a:t> </a:t>
-          </a:r>
-          <a:r>
-            <a:rPr lang="de-DE" sz="2000" kern="1200" smtClean="0"/>
-            <a:t>Tree</a:t>
-          </a:r>
-          <a:endParaRPr lang="de-DE" sz="2000" kern="1200" dirty="0"/>
+          <a:endParaRPr lang="en-GB" sz="2000" kern="1200" noProof="0" dirty="0"/>
         </a:p>
       </dsp:txBody>
       <dsp:txXfrm>
@@ -3508,7 +3497,7 @@
               <a:spcPct val="35000"/>
             </a:spcAft>
           </a:pPr>
-          <a:endParaRPr lang="de-DE" sz="2400" kern="1200" dirty="0"/>
+          <a:endParaRPr lang="en-GB" sz="2400" kern="1200" noProof="0" dirty="0"/>
         </a:p>
       </dsp:txBody>
       <dsp:txXfrm>
@@ -3610,7 +3599,7 @@
               <a:spcPct val="35000"/>
             </a:spcAft>
           </a:pPr>
-          <a:endParaRPr lang="de-DE" sz="2400" kern="1200" dirty="0"/>
+          <a:endParaRPr lang="en-GB" sz="2400" kern="1200" noProof="0" dirty="0"/>
         </a:p>
       </dsp:txBody>
       <dsp:txXfrm>
@@ -3712,7 +3701,7 @@
               <a:spcPct val="35000"/>
             </a:spcAft>
           </a:pPr>
-          <a:endParaRPr lang="de-DE" sz="2400" kern="1200" dirty="0"/>
+          <a:endParaRPr lang="en-GB" sz="2400" kern="1200" noProof="0" dirty="0"/>
         </a:p>
       </dsp:txBody>
       <dsp:txXfrm>
@@ -3814,7 +3803,7 @@
               <a:spcPct val="35000"/>
             </a:spcAft>
           </a:pPr>
-          <a:endParaRPr lang="de-DE" sz="2400" kern="1200" dirty="0"/>
+          <a:endParaRPr lang="en-GB" sz="2400" kern="1200" noProof="0" dirty="0"/>
         </a:p>
       </dsp:txBody>
       <dsp:txXfrm>
@@ -3916,7 +3905,7 @@
               <a:spcPct val="35000"/>
             </a:spcAft>
           </a:pPr>
-          <a:endParaRPr lang="de-DE" sz="2400" kern="1200" dirty="0"/>
+          <a:endParaRPr lang="en-GB" sz="2400" kern="1200" noProof="0" dirty="0"/>
         </a:p>
       </dsp:txBody>
       <dsp:txXfrm>
@@ -4018,7 +4007,7 @@
               <a:spcPct val="35000"/>
             </a:spcAft>
           </a:pPr>
-          <a:endParaRPr lang="de-DE" sz="2400" kern="1200" dirty="0"/>
+          <a:endParaRPr lang="en-GB" sz="2400" kern="1200" noProof="0" dirty="0"/>
         </a:p>
       </dsp:txBody>
       <dsp:txXfrm>
@@ -4120,7 +4109,7 @@
               <a:spcPct val="35000"/>
             </a:spcAft>
           </a:pPr>
-          <a:endParaRPr lang="de-DE" sz="2400" kern="1200" dirty="0"/>
+          <a:endParaRPr lang="en-GB" sz="2400" kern="1200" noProof="0" dirty="0"/>
         </a:p>
       </dsp:txBody>
       <dsp:txXfrm>
@@ -4222,7 +4211,7 @@
               <a:spcPct val="35000"/>
             </a:spcAft>
           </a:pPr>
-          <a:endParaRPr lang="de-DE" sz="2400" kern="1200" dirty="0"/>
+          <a:endParaRPr lang="en-GB" sz="2400" kern="1200" noProof="0" dirty="0"/>
         </a:p>
       </dsp:txBody>
       <dsp:txXfrm>
@@ -4324,7 +4313,7 @@
               <a:spcPct val="35000"/>
             </a:spcAft>
           </a:pPr>
-          <a:endParaRPr lang="de-DE" sz="2400" kern="1200" dirty="0"/>
+          <a:endParaRPr lang="en-GB" sz="2400" kern="1200" noProof="0" dirty="0"/>
         </a:p>
       </dsp:txBody>
       <dsp:txXfrm>
@@ -4426,7 +4415,7 @@
               <a:spcPct val="35000"/>
             </a:spcAft>
           </a:pPr>
-          <a:endParaRPr lang="de-DE" sz="2400" kern="1200" dirty="0"/>
+          <a:endParaRPr lang="en-GB" sz="2400" kern="1200" noProof="0" dirty="0"/>
         </a:p>
       </dsp:txBody>
       <dsp:txXfrm>
@@ -4528,7 +4517,7 @@
               <a:spcPct val="35000"/>
             </a:spcAft>
           </a:pPr>
-          <a:endParaRPr lang="de-DE" sz="2400" kern="1200" dirty="0"/>
+          <a:endParaRPr lang="en-GB" sz="2400" kern="1200" noProof="0" dirty="0"/>
         </a:p>
       </dsp:txBody>
       <dsp:txXfrm>
@@ -6930,7 +6919,7 @@
           <a:p>
             <a:fld id="{E92DEB45-B9ED-42AB-9F1D-48349D5AF979}" type="datetimeFigureOut">
               <a:rPr lang="de-DE" smtClean="0"/>
-              <a:t>01.06.2015</a:t>
+              <a:t>02.06.2015</a:t>
             </a:fld>
             <a:endParaRPr lang="de-DE"/>
           </a:p>
@@ -7089,7 +7078,7 @@
           <a:p>
             <a:fld id="{1157CB78-9269-4442-88B8-B9A4BD50A0FF}" type="slidenum">
               <a:rPr lang="de-DE" smtClean="0"/>
-              <a:t>‹#›</a:t>
+              <a:t>‹Nr.›</a:t>
             </a:fld>
             <a:endParaRPr lang="de-DE"/>
           </a:p>
@@ -7436,7 +7425,7 @@
           <a:p>
             <a:fld id="{931D9FDD-5D19-48DC-94F9-AC236C63AC1C}" type="datetimeFigureOut">
               <a:rPr lang="de-DE" smtClean="0"/>
-              <a:t>01.06.2015</a:t>
+              <a:t>02.06.2015</a:t>
             </a:fld>
             <a:endParaRPr lang="de-DE"/>
           </a:p>
@@ -7478,7 +7467,7 @@
           <a:p>
             <a:fld id="{8627982B-0C08-444F-A620-23F1D62B75D0}" type="slidenum">
               <a:rPr lang="de-DE" smtClean="0"/>
-              <a:t>‹#›</a:t>
+              <a:t>‹Nr.›</a:t>
             </a:fld>
             <a:endParaRPr lang="de-DE"/>
           </a:p>
@@ -7606,7 +7595,7 @@
           <a:p>
             <a:fld id="{931D9FDD-5D19-48DC-94F9-AC236C63AC1C}" type="datetimeFigureOut">
               <a:rPr lang="de-DE" smtClean="0"/>
-              <a:t>01.06.2015</a:t>
+              <a:t>02.06.2015</a:t>
             </a:fld>
             <a:endParaRPr lang="de-DE"/>
           </a:p>
@@ -7648,7 +7637,7 @@
           <a:p>
             <a:fld id="{8627982B-0C08-444F-A620-23F1D62B75D0}" type="slidenum">
               <a:rPr lang="de-DE" smtClean="0"/>
-              <a:t>‹#›</a:t>
+              <a:t>‹Nr.›</a:t>
             </a:fld>
             <a:endParaRPr lang="de-DE"/>
           </a:p>
@@ -7786,7 +7775,7 @@
           <a:p>
             <a:fld id="{931D9FDD-5D19-48DC-94F9-AC236C63AC1C}" type="datetimeFigureOut">
               <a:rPr lang="de-DE" smtClean="0"/>
-              <a:t>01.06.2015</a:t>
+              <a:t>02.06.2015</a:t>
             </a:fld>
             <a:endParaRPr lang="de-DE"/>
           </a:p>
@@ -7828,7 +7817,7 @@
           <a:p>
             <a:fld id="{8627982B-0C08-444F-A620-23F1D62B75D0}" type="slidenum">
               <a:rPr lang="de-DE" smtClean="0"/>
-              <a:t>‹#›</a:t>
+              <a:t>‹Nr.›</a:t>
             </a:fld>
             <a:endParaRPr lang="de-DE"/>
           </a:p>
@@ -8106,7 +8095,7 @@
           <a:p>
             <a:fld id="{931D9FDD-5D19-48DC-94F9-AC236C63AC1C}" type="datetimeFigureOut">
               <a:rPr lang="de-DE" smtClean="0"/>
-              <a:t>01.06.2015</a:t>
+              <a:t>02.06.2015</a:t>
             </a:fld>
             <a:endParaRPr lang="de-DE"/>
           </a:p>
@@ -8148,7 +8137,7 @@
           <a:p>
             <a:fld id="{8627982B-0C08-444F-A620-23F1D62B75D0}" type="slidenum">
               <a:rPr lang="de-DE" smtClean="0"/>
-              <a:t>‹#›</a:t>
+              <a:t>‹Nr.›</a:t>
             </a:fld>
             <a:endParaRPr lang="de-DE"/>
           </a:p>
@@ -8352,7 +8341,7 @@
           <a:p>
             <a:fld id="{931D9FDD-5D19-48DC-94F9-AC236C63AC1C}" type="datetimeFigureOut">
               <a:rPr lang="de-DE" smtClean="0"/>
-              <a:t>01.06.2015</a:t>
+              <a:t>02.06.2015</a:t>
             </a:fld>
             <a:endParaRPr lang="de-DE"/>
           </a:p>
@@ -8394,7 +8383,7 @@
           <a:p>
             <a:fld id="{8627982B-0C08-444F-A620-23F1D62B75D0}" type="slidenum">
               <a:rPr lang="de-DE" smtClean="0"/>
-              <a:t>‹#›</a:t>
+              <a:t>‹Nr.›</a:t>
             </a:fld>
             <a:endParaRPr lang="de-DE"/>
           </a:p>
@@ -8584,7 +8573,7 @@
           <a:p>
             <a:fld id="{931D9FDD-5D19-48DC-94F9-AC236C63AC1C}" type="datetimeFigureOut">
               <a:rPr lang="de-DE" smtClean="0"/>
-              <a:t>01.06.2015</a:t>
+              <a:t>02.06.2015</a:t>
             </a:fld>
             <a:endParaRPr lang="de-DE"/>
           </a:p>
@@ -8626,7 +8615,7 @@
           <a:p>
             <a:fld id="{8627982B-0C08-444F-A620-23F1D62B75D0}" type="slidenum">
               <a:rPr lang="de-DE" smtClean="0"/>
-              <a:t>‹#›</a:t>
+              <a:t>‹Nr.›</a:t>
             </a:fld>
             <a:endParaRPr lang="de-DE"/>
           </a:p>
@@ -8951,7 +8940,7 @@
           <a:p>
             <a:fld id="{931D9FDD-5D19-48DC-94F9-AC236C63AC1C}" type="datetimeFigureOut">
               <a:rPr lang="de-DE" smtClean="0"/>
-              <a:t>01.06.2015</a:t>
+              <a:t>02.06.2015</a:t>
             </a:fld>
             <a:endParaRPr lang="de-DE"/>
           </a:p>
@@ -8993,7 +8982,7 @@
           <a:p>
             <a:fld id="{8627982B-0C08-444F-A620-23F1D62B75D0}" type="slidenum">
               <a:rPr lang="de-DE" smtClean="0"/>
-              <a:t>‹#›</a:t>
+              <a:t>‹Nr.›</a:t>
             </a:fld>
             <a:endParaRPr lang="de-DE"/>
           </a:p>
@@ -9069,7 +9058,7 @@
           <a:p>
             <a:fld id="{931D9FDD-5D19-48DC-94F9-AC236C63AC1C}" type="datetimeFigureOut">
               <a:rPr lang="de-DE" smtClean="0"/>
-              <a:t>01.06.2015</a:t>
+              <a:t>02.06.2015</a:t>
             </a:fld>
             <a:endParaRPr lang="de-DE"/>
           </a:p>
@@ -9111,7 +9100,7 @@
           <a:p>
             <a:fld id="{8627982B-0C08-444F-A620-23F1D62B75D0}" type="slidenum">
               <a:rPr lang="de-DE" smtClean="0"/>
-              <a:t>‹#›</a:t>
+              <a:t>‹Nr.›</a:t>
             </a:fld>
             <a:endParaRPr lang="de-DE"/>
           </a:p>
@@ -9164,7 +9153,7 @@
           <a:p>
             <a:fld id="{931D9FDD-5D19-48DC-94F9-AC236C63AC1C}" type="datetimeFigureOut">
               <a:rPr lang="de-DE" smtClean="0"/>
-              <a:t>01.06.2015</a:t>
+              <a:t>02.06.2015</a:t>
             </a:fld>
             <a:endParaRPr lang="de-DE"/>
           </a:p>
@@ -9206,7 +9195,7 @@
           <a:p>
             <a:fld id="{8627982B-0C08-444F-A620-23F1D62B75D0}" type="slidenum">
               <a:rPr lang="de-DE" smtClean="0"/>
-              <a:t>‹#›</a:t>
+              <a:t>‹Nr.›</a:t>
             </a:fld>
             <a:endParaRPr lang="de-DE"/>
           </a:p>
@@ -9441,7 +9430,7 @@
           <a:p>
             <a:fld id="{931D9FDD-5D19-48DC-94F9-AC236C63AC1C}" type="datetimeFigureOut">
               <a:rPr lang="de-DE" smtClean="0"/>
-              <a:t>01.06.2015</a:t>
+              <a:t>02.06.2015</a:t>
             </a:fld>
             <a:endParaRPr lang="de-DE"/>
           </a:p>
@@ -9483,7 +9472,7 @@
           <a:p>
             <a:fld id="{8627982B-0C08-444F-A620-23F1D62B75D0}" type="slidenum">
               <a:rPr lang="de-DE" smtClean="0"/>
-              <a:t>‹#›</a:t>
+              <a:t>‹Nr.›</a:t>
             </a:fld>
             <a:endParaRPr lang="de-DE"/>
           </a:p>
@@ -9694,7 +9683,7 @@
           <a:p>
             <a:fld id="{931D9FDD-5D19-48DC-94F9-AC236C63AC1C}" type="datetimeFigureOut">
               <a:rPr lang="de-DE" smtClean="0"/>
-              <a:t>01.06.2015</a:t>
+              <a:t>02.06.2015</a:t>
             </a:fld>
             <a:endParaRPr lang="de-DE"/>
           </a:p>
@@ -9736,7 +9725,7 @@
           <a:p>
             <a:fld id="{8627982B-0C08-444F-A620-23F1D62B75D0}" type="slidenum">
               <a:rPr lang="de-DE" smtClean="0"/>
-              <a:t>‹#›</a:t>
+              <a:t>‹Nr.›</a:t>
             </a:fld>
             <a:endParaRPr lang="de-DE"/>
           </a:p>
@@ -9907,7 +9896,7 @@
           <a:p>
             <a:fld id="{931D9FDD-5D19-48DC-94F9-AC236C63AC1C}" type="datetimeFigureOut">
               <a:rPr lang="de-DE" smtClean="0"/>
-              <a:t>01.06.2015</a:t>
+              <a:t>02.06.2015</a:t>
             </a:fld>
             <a:endParaRPr lang="de-DE"/>
           </a:p>
@@ -9985,7 +9974,7 @@
           <a:p>
             <a:fld id="{8627982B-0C08-444F-A620-23F1D62B75D0}" type="slidenum">
               <a:rPr lang="de-DE" smtClean="0"/>
-              <a:t>‹#›</a:t>
+              <a:t>‹Nr.›</a:t>
             </a:fld>
             <a:endParaRPr lang="de-DE"/>
           </a:p>
@@ -10323,7 +10312,7 @@
             <p:ph idx="1"/>
             <p:extLst>
               <p:ext uri="{D42A27DB-BD31-4B8C-83A1-F6EECF244321}">
-                <p14:modId xmlns:p14="http://schemas.microsoft.com/office/powerpoint/2010/main" val="126273975"/>
+                <p14:modId xmlns:p14="http://schemas.microsoft.com/office/powerpoint/2010/main" val="2251959985"/>
               </p:ext>
             </p:extLst>
           </p:nvPr>
@@ -10354,18 +10343,10 @@
           <a:lstStyle/>
           <a:p>
             <a:r>
-              <a:rPr lang="de-DE" dirty="0" err="1" smtClean="0"/>
-              <a:t>Function</a:t>
+              <a:rPr lang="en-GB" dirty="0" smtClean="0"/>
+              <a:t>Function Tree</a:t>
             </a:r>
-            <a:r>
-              <a:rPr lang="de-DE" dirty="0" smtClean="0"/>
-              <a:t> </a:t>
-            </a:r>
-            <a:r>
-              <a:rPr lang="de-DE" dirty="0" err="1" smtClean="0"/>
-              <a:t>Tree</a:t>
-            </a:r>
-            <a:endParaRPr lang="de-DE" dirty="0"/>
+            <a:endParaRPr lang="en-GB" dirty="0"/>
           </a:p>
         </p:txBody>
       </p:sp>

</xml_diff>